<commit_message>
Began preparing presentation for lab mtg
</commit_message>
<xml_diff>
--- a/figures/phylogeneticTrees/phylo-tree-clades.pptx
+++ b/figures/phylogeneticTrees/phylo-tree-clades.pptx
@@ -302,7 +302,7 @@
           <a:p>
             <a:fld id="{488CEBE3-1740-4D45-B435-43B16EB302B8}" type="datetimeFigureOut">
               <a:rPr lang="ko-KR" altLang="en-US" smtClean="0"/>
-              <a:t>2020-05-20</a:t>
+              <a:t>2020-06-03</a:t>
             </a:fld>
             <a:endParaRPr lang="ko-KR" altLang="en-US"/>
           </a:p>
@@ -470,7 +470,7 @@
           <a:p>
             <a:fld id="{488CEBE3-1740-4D45-B435-43B16EB302B8}" type="datetimeFigureOut">
               <a:rPr lang="ko-KR" altLang="en-US" smtClean="0"/>
-              <a:t>2020-05-20</a:t>
+              <a:t>2020-06-03</a:t>
             </a:fld>
             <a:endParaRPr lang="ko-KR" altLang="en-US"/>
           </a:p>
@@ -648,7 +648,7 @@
           <a:p>
             <a:fld id="{488CEBE3-1740-4D45-B435-43B16EB302B8}" type="datetimeFigureOut">
               <a:rPr lang="ko-KR" altLang="en-US" smtClean="0"/>
-              <a:t>2020-05-20</a:t>
+              <a:t>2020-06-03</a:t>
             </a:fld>
             <a:endParaRPr lang="ko-KR" altLang="en-US"/>
           </a:p>
@@ -816,7 +816,7 @@
           <a:p>
             <a:fld id="{488CEBE3-1740-4D45-B435-43B16EB302B8}" type="datetimeFigureOut">
               <a:rPr lang="ko-KR" altLang="en-US" smtClean="0"/>
-              <a:t>2020-05-20</a:t>
+              <a:t>2020-06-03</a:t>
             </a:fld>
             <a:endParaRPr lang="ko-KR" altLang="en-US"/>
           </a:p>
@@ -1061,7 +1061,7 @@
           <a:p>
             <a:fld id="{488CEBE3-1740-4D45-B435-43B16EB302B8}" type="datetimeFigureOut">
               <a:rPr lang="ko-KR" altLang="en-US" smtClean="0"/>
-              <a:t>2020-05-20</a:t>
+              <a:t>2020-06-03</a:t>
             </a:fld>
             <a:endParaRPr lang="ko-KR" altLang="en-US"/>
           </a:p>
@@ -1346,7 +1346,7 @@
           <a:p>
             <a:fld id="{488CEBE3-1740-4D45-B435-43B16EB302B8}" type="datetimeFigureOut">
               <a:rPr lang="ko-KR" altLang="en-US" smtClean="0"/>
-              <a:t>2020-05-20</a:t>
+              <a:t>2020-06-03</a:t>
             </a:fld>
             <a:endParaRPr lang="ko-KR" altLang="en-US"/>
           </a:p>
@@ -1770,7 +1770,7 @@
           <a:p>
             <a:fld id="{488CEBE3-1740-4D45-B435-43B16EB302B8}" type="datetimeFigureOut">
               <a:rPr lang="ko-KR" altLang="en-US" smtClean="0"/>
-              <a:t>2020-05-20</a:t>
+              <a:t>2020-06-03</a:t>
             </a:fld>
             <a:endParaRPr lang="ko-KR" altLang="en-US"/>
           </a:p>
@@ -1887,7 +1887,7 @@
           <a:p>
             <a:fld id="{488CEBE3-1740-4D45-B435-43B16EB302B8}" type="datetimeFigureOut">
               <a:rPr lang="ko-KR" altLang="en-US" smtClean="0"/>
-              <a:t>2020-05-20</a:t>
+              <a:t>2020-06-03</a:t>
             </a:fld>
             <a:endParaRPr lang="ko-KR" altLang="en-US"/>
           </a:p>
@@ -1982,7 +1982,7 @@
           <a:p>
             <a:fld id="{488CEBE3-1740-4D45-B435-43B16EB302B8}" type="datetimeFigureOut">
               <a:rPr lang="ko-KR" altLang="en-US" smtClean="0"/>
-              <a:t>2020-05-20</a:t>
+              <a:t>2020-06-03</a:t>
             </a:fld>
             <a:endParaRPr lang="ko-KR" altLang="en-US"/>
           </a:p>
@@ -2257,7 +2257,7 @@
           <a:p>
             <a:fld id="{488CEBE3-1740-4D45-B435-43B16EB302B8}" type="datetimeFigureOut">
               <a:rPr lang="ko-KR" altLang="en-US" smtClean="0"/>
-              <a:t>2020-05-20</a:t>
+              <a:t>2020-06-03</a:t>
             </a:fld>
             <a:endParaRPr lang="ko-KR" altLang="en-US"/>
           </a:p>
@@ -2509,7 +2509,7 @@
           <a:p>
             <a:fld id="{488CEBE3-1740-4D45-B435-43B16EB302B8}" type="datetimeFigureOut">
               <a:rPr lang="ko-KR" altLang="en-US" smtClean="0"/>
-              <a:t>2020-05-20</a:t>
+              <a:t>2020-06-03</a:t>
             </a:fld>
             <a:endParaRPr lang="ko-KR" altLang="en-US"/>
           </a:p>
@@ -2720,7 +2720,7 @@
           <a:p>
             <a:fld id="{488CEBE3-1740-4D45-B435-43B16EB302B8}" type="datetimeFigureOut">
               <a:rPr lang="ko-KR" altLang="en-US" smtClean="0"/>
-              <a:t>2020-05-20</a:t>
+              <a:t>2020-06-03</a:t>
             </a:fld>
             <a:endParaRPr lang="ko-KR" altLang="en-US"/>
           </a:p>
@@ -3097,6 +3097,318 @@
       </p:grpSpPr>
       <p:sp>
         <p:nvSpPr>
+          <p:cNvPr id="211" name="Rectangle 210">
+            <a:extLst>
+              <a:ext uri="{FF2B5EF4-FFF2-40B4-BE49-F238E27FC236}">
+                <a16:creationId xmlns:a16="http://schemas.microsoft.com/office/drawing/2014/main" id="{1CEF6541-87AF-485B-81AB-CF9354840184}"/>
+              </a:ext>
+            </a:extLst>
+          </p:cNvPr>
+          <p:cNvSpPr/>
+          <p:nvPr/>
+        </p:nvSpPr>
+        <p:spPr>
+          <a:xfrm>
+            <a:off x="1753815" y="9344627"/>
+            <a:ext cx="2743200" cy="500501"/>
+          </a:xfrm>
+          <a:prstGeom prst="rect">
+            <a:avLst/>
+          </a:prstGeom>
+          <a:solidFill>
+            <a:srgbClr val="BCF5A5"/>
+          </a:solidFill>
+          <a:ln w="19050">
+            <a:noFill/>
+          </a:ln>
+        </p:spPr>
+        <p:style>
+          <a:lnRef idx="2">
+            <a:schemeClr val="accent1">
+              <a:shade val="50000"/>
+            </a:schemeClr>
+          </a:lnRef>
+          <a:fillRef idx="1">
+            <a:schemeClr val="accent1"/>
+          </a:fillRef>
+          <a:effectRef idx="0">
+            <a:schemeClr val="accent1"/>
+          </a:effectRef>
+          <a:fontRef idx="minor">
+            <a:schemeClr val="lt1"/>
+          </a:fontRef>
+        </p:style>
+        <p:txBody>
+          <a:bodyPr rtlCol="0" anchor="ctr"/>
+          <a:lstStyle/>
+          <a:p>
+            <a:pPr algn="ctr"/>
+            <a:endParaRPr lang="en-US"/>
+          </a:p>
+        </p:txBody>
+      </p:sp>
+      <p:sp>
+        <p:nvSpPr>
+          <p:cNvPr id="210" name="Rectangle 209">
+            <a:extLst>
+              <a:ext uri="{FF2B5EF4-FFF2-40B4-BE49-F238E27FC236}">
+                <a16:creationId xmlns:a16="http://schemas.microsoft.com/office/drawing/2014/main" id="{491F355C-D5CC-4007-895C-1CD303C16BAD}"/>
+              </a:ext>
+            </a:extLst>
+          </p:cNvPr>
+          <p:cNvSpPr/>
+          <p:nvPr/>
+        </p:nvSpPr>
+        <p:spPr>
+          <a:xfrm>
+            <a:off x="1753815" y="9004465"/>
+            <a:ext cx="2743200" cy="325895"/>
+          </a:xfrm>
+          <a:prstGeom prst="rect">
+            <a:avLst/>
+          </a:prstGeom>
+          <a:solidFill>
+            <a:srgbClr val="F6E0B8"/>
+          </a:solidFill>
+          <a:ln w="19050">
+            <a:noFill/>
+          </a:ln>
+        </p:spPr>
+        <p:style>
+          <a:lnRef idx="2">
+            <a:schemeClr val="accent1">
+              <a:shade val="50000"/>
+            </a:schemeClr>
+          </a:lnRef>
+          <a:fillRef idx="1">
+            <a:schemeClr val="accent1"/>
+          </a:fillRef>
+          <a:effectRef idx="0">
+            <a:schemeClr val="accent1"/>
+          </a:effectRef>
+          <a:fontRef idx="minor">
+            <a:schemeClr val="lt1"/>
+          </a:fontRef>
+        </p:style>
+        <p:txBody>
+          <a:bodyPr rtlCol="0" anchor="ctr"/>
+          <a:lstStyle/>
+          <a:p>
+            <a:pPr algn="ctr"/>
+            <a:endParaRPr lang="en-US"/>
+          </a:p>
+        </p:txBody>
+      </p:sp>
+      <p:sp>
+        <p:nvSpPr>
+          <p:cNvPr id="209" name="Rectangle 208">
+            <a:extLst>
+              <a:ext uri="{FF2B5EF4-FFF2-40B4-BE49-F238E27FC236}">
+                <a16:creationId xmlns:a16="http://schemas.microsoft.com/office/drawing/2014/main" id="{CEED73C1-8904-413D-BCF3-83A83BEAD01E}"/>
+              </a:ext>
+            </a:extLst>
+          </p:cNvPr>
+          <p:cNvSpPr/>
+          <p:nvPr/>
+        </p:nvSpPr>
+        <p:spPr>
+          <a:xfrm>
+            <a:off x="1753815" y="3859733"/>
+            <a:ext cx="2743200" cy="5142204"/>
+          </a:xfrm>
+          <a:prstGeom prst="rect">
+            <a:avLst/>
+          </a:prstGeom>
+          <a:solidFill>
+            <a:srgbClr val="F8C4C4"/>
+          </a:solidFill>
+          <a:ln w="19050">
+            <a:noFill/>
+          </a:ln>
+        </p:spPr>
+        <p:style>
+          <a:lnRef idx="2">
+            <a:schemeClr val="accent1">
+              <a:shade val="50000"/>
+            </a:schemeClr>
+          </a:lnRef>
+          <a:fillRef idx="1">
+            <a:schemeClr val="accent1"/>
+          </a:fillRef>
+          <a:effectRef idx="0">
+            <a:schemeClr val="accent1"/>
+          </a:effectRef>
+          <a:fontRef idx="minor">
+            <a:schemeClr val="lt1"/>
+          </a:fontRef>
+        </p:style>
+        <p:txBody>
+          <a:bodyPr rtlCol="0" anchor="ctr"/>
+          <a:lstStyle/>
+          <a:p>
+            <a:pPr algn="ctr"/>
+            <a:endParaRPr lang="en-US"/>
+          </a:p>
+        </p:txBody>
+      </p:sp>
+      <p:sp>
+        <p:nvSpPr>
+          <p:cNvPr id="208" name="Rectangle 207">
+            <a:extLst>
+              <a:ext uri="{FF2B5EF4-FFF2-40B4-BE49-F238E27FC236}">
+                <a16:creationId xmlns:a16="http://schemas.microsoft.com/office/drawing/2014/main" id="{87273A78-6D21-4C03-91DB-F6548857D39E}"/>
+              </a:ext>
+            </a:extLst>
+          </p:cNvPr>
+          <p:cNvSpPr/>
+          <p:nvPr/>
+        </p:nvSpPr>
+        <p:spPr>
+          <a:xfrm>
+            <a:off x="1753815" y="3713054"/>
+            <a:ext cx="2743200" cy="130254"/>
+          </a:xfrm>
+          <a:prstGeom prst="rect">
+            <a:avLst/>
+          </a:prstGeom>
+          <a:solidFill>
+            <a:srgbClr val="EDC4F8"/>
+          </a:solidFill>
+          <a:ln w="19050">
+            <a:noFill/>
+          </a:ln>
+        </p:spPr>
+        <p:style>
+          <a:lnRef idx="2">
+            <a:schemeClr val="accent1">
+              <a:shade val="50000"/>
+            </a:schemeClr>
+          </a:lnRef>
+          <a:fillRef idx="1">
+            <a:schemeClr val="accent1"/>
+          </a:fillRef>
+          <a:effectRef idx="0">
+            <a:schemeClr val="accent1"/>
+          </a:effectRef>
+          <a:fontRef idx="minor">
+            <a:schemeClr val="lt1"/>
+          </a:fontRef>
+        </p:style>
+        <p:txBody>
+          <a:bodyPr rtlCol="0" anchor="ctr"/>
+          <a:lstStyle/>
+          <a:p>
+            <a:pPr algn="ctr"/>
+            <a:endParaRPr lang="en-US"/>
+          </a:p>
+        </p:txBody>
+      </p:sp>
+      <p:sp>
+        <p:nvSpPr>
+          <p:cNvPr id="207" name="Rectangle 206">
+            <a:extLst>
+              <a:ext uri="{FF2B5EF4-FFF2-40B4-BE49-F238E27FC236}">
+                <a16:creationId xmlns:a16="http://schemas.microsoft.com/office/drawing/2014/main" id="{402A411E-595B-406E-8AF0-72BE05B6FAF2}"/>
+              </a:ext>
+            </a:extLst>
+          </p:cNvPr>
+          <p:cNvSpPr/>
+          <p:nvPr/>
+        </p:nvSpPr>
+        <p:spPr>
+          <a:xfrm>
+            <a:off x="1753815" y="2695150"/>
+            <a:ext cx="2743200" cy="999676"/>
+          </a:xfrm>
+          <a:prstGeom prst="rect">
+            <a:avLst/>
+          </a:prstGeom>
+          <a:solidFill>
+            <a:srgbClr val="C4C5DE"/>
+          </a:solidFill>
+          <a:ln w="19050">
+            <a:noFill/>
+          </a:ln>
+        </p:spPr>
+        <p:style>
+          <a:lnRef idx="2">
+            <a:schemeClr val="accent1">
+              <a:shade val="50000"/>
+            </a:schemeClr>
+          </a:lnRef>
+          <a:fillRef idx="1">
+            <a:schemeClr val="accent1"/>
+          </a:fillRef>
+          <a:effectRef idx="0">
+            <a:schemeClr val="accent1"/>
+          </a:effectRef>
+          <a:fontRef idx="minor">
+            <a:schemeClr val="lt1"/>
+          </a:fontRef>
+        </p:style>
+        <p:txBody>
+          <a:bodyPr rtlCol="0" anchor="ctr"/>
+          <a:lstStyle/>
+          <a:p>
+            <a:pPr algn="ctr"/>
+            <a:endParaRPr lang="en-US"/>
+          </a:p>
+        </p:txBody>
+      </p:sp>
+      <p:sp>
+        <p:nvSpPr>
+          <p:cNvPr id="5" name="Rectangle 4">
+            <a:extLst>
+              <a:ext uri="{FF2B5EF4-FFF2-40B4-BE49-F238E27FC236}">
+                <a16:creationId xmlns:a16="http://schemas.microsoft.com/office/drawing/2014/main" id="{DD8DC9E8-39FD-4F24-B5B4-D807E0455076}"/>
+              </a:ext>
+            </a:extLst>
+          </p:cNvPr>
+          <p:cNvSpPr/>
+          <p:nvPr/>
+        </p:nvSpPr>
+        <p:spPr>
+          <a:xfrm>
+            <a:off x="1753815" y="1204585"/>
+            <a:ext cx="2743200" cy="1473815"/>
+          </a:xfrm>
+          <a:prstGeom prst="rect">
+            <a:avLst/>
+          </a:prstGeom>
+          <a:solidFill>
+            <a:srgbClr val="CAE3E4"/>
+          </a:solidFill>
+          <a:ln w="19050">
+            <a:noFill/>
+          </a:ln>
+        </p:spPr>
+        <p:style>
+          <a:lnRef idx="2">
+            <a:schemeClr val="accent1">
+              <a:shade val="50000"/>
+            </a:schemeClr>
+          </a:lnRef>
+          <a:fillRef idx="1">
+            <a:schemeClr val="accent1"/>
+          </a:fillRef>
+          <a:effectRef idx="0">
+            <a:schemeClr val="accent1"/>
+          </a:effectRef>
+          <a:fontRef idx="minor">
+            <a:schemeClr val="lt1"/>
+          </a:fontRef>
+        </p:style>
+        <p:txBody>
+          <a:bodyPr rtlCol="0" anchor="ctr"/>
+          <a:lstStyle/>
+          <a:p>
+            <a:pPr algn="ctr"/>
+            <a:endParaRPr lang="en-US"/>
+          </a:p>
+        </p:txBody>
+      </p:sp>
+      <p:sp>
+        <p:nvSpPr>
           <p:cNvPr id="1400" name="TextBox 1399"/>
           <p:cNvSpPr txBox="1"/>
           <p:nvPr/>
@@ -34146,318 +34458,6 @@
           </p:txBody>
         </p:sp>
       </p:grpSp>
-      <p:sp>
-        <p:nvSpPr>
-          <p:cNvPr id="5" name="Rectangle 4">
-            <a:extLst>
-              <a:ext uri="{FF2B5EF4-FFF2-40B4-BE49-F238E27FC236}">
-                <a16:creationId xmlns:a16="http://schemas.microsoft.com/office/drawing/2014/main" id="{DD8DC9E8-39FD-4F24-B5B4-D807E0455076}"/>
-              </a:ext>
-            </a:extLst>
-          </p:cNvPr>
-          <p:cNvSpPr/>
-          <p:nvPr/>
-        </p:nvSpPr>
-        <p:spPr>
-          <a:xfrm>
-            <a:off x="1753815" y="1204585"/>
-            <a:ext cx="2743200" cy="1473815"/>
-          </a:xfrm>
-          <a:prstGeom prst="rect">
-            <a:avLst/>
-          </a:prstGeom>
-          <a:noFill/>
-          <a:ln w="19050">
-            <a:solidFill>
-              <a:srgbClr val="09C738"/>
-            </a:solidFill>
-          </a:ln>
-        </p:spPr>
-        <p:style>
-          <a:lnRef idx="2">
-            <a:schemeClr val="accent1">
-              <a:shade val="50000"/>
-            </a:schemeClr>
-          </a:lnRef>
-          <a:fillRef idx="1">
-            <a:schemeClr val="accent1"/>
-          </a:fillRef>
-          <a:effectRef idx="0">
-            <a:schemeClr val="accent1"/>
-          </a:effectRef>
-          <a:fontRef idx="minor">
-            <a:schemeClr val="lt1"/>
-          </a:fontRef>
-        </p:style>
-        <p:txBody>
-          <a:bodyPr rtlCol="0" anchor="ctr"/>
-          <a:lstStyle/>
-          <a:p>
-            <a:pPr algn="ctr"/>
-            <a:endParaRPr lang="en-US"/>
-          </a:p>
-        </p:txBody>
-      </p:sp>
-      <p:sp>
-        <p:nvSpPr>
-          <p:cNvPr id="207" name="Rectangle 206">
-            <a:extLst>
-              <a:ext uri="{FF2B5EF4-FFF2-40B4-BE49-F238E27FC236}">
-                <a16:creationId xmlns:a16="http://schemas.microsoft.com/office/drawing/2014/main" id="{402A411E-595B-406E-8AF0-72BE05B6FAF2}"/>
-              </a:ext>
-            </a:extLst>
-          </p:cNvPr>
-          <p:cNvSpPr/>
-          <p:nvPr/>
-        </p:nvSpPr>
-        <p:spPr>
-          <a:xfrm>
-            <a:off x="1753815" y="2695150"/>
-            <a:ext cx="2743200" cy="999676"/>
-          </a:xfrm>
-          <a:prstGeom prst="rect">
-            <a:avLst/>
-          </a:prstGeom>
-          <a:noFill/>
-          <a:ln w="19050">
-            <a:solidFill>
-              <a:srgbClr val="0DBECB"/>
-            </a:solidFill>
-          </a:ln>
-        </p:spPr>
-        <p:style>
-          <a:lnRef idx="2">
-            <a:schemeClr val="accent1">
-              <a:shade val="50000"/>
-            </a:schemeClr>
-          </a:lnRef>
-          <a:fillRef idx="1">
-            <a:schemeClr val="accent1"/>
-          </a:fillRef>
-          <a:effectRef idx="0">
-            <a:schemeClr val="accent1"/>
-          </a:effectRef>
-          <a:fontRef idx="minor">
-            <a:schemeClr val="lt1"/>
-          </a:fontRef>
-        </p:style>
-        <p:txBody>
-          <a:bodyPr rtlCol="0" anchor="ctr"/>
-          <a:lstStyle/>
-          <a:p>
-            <a:pPr algn="ctr"/>
-            <a:endParaRPr lang="en-US"/>
-          </a:p>
-        </p:txBody>
-      </p:sp>
-      <p:sp>
-        <p:nvSpPr>
-          <p:cNvPr id="208" name="Rectangle 207">
-            <a:extLst>
-              <a:ext uri="{FF2B5EF4-FFF2-40B4-BE49-F238E27FC236}">
-                <a16:creationId xmlns:a16="http://schemas.microsoft.com/office/drawing/2014/main" id="{87273A78-6D21-4C03-91DB-F6548857D39E}"/>
-              </a:ext>
-            </a:extLst>
-          </p:cNvPr>
-          <p:cNvSpPr/>
-          <p:nvPr/>
-        </p:nvSpPr>
-        <p:spPr>
-          <a:xfrm>
-            <a:off x="1753815" y="3713054"/>
-            <a:ext cx="2743200" cy="130254"/>
-          </a:xfrm>
-          <a:prstGeom prst="rect">
-            <a:avLst/>
-          </a:prstGeom>
-          <a:noFill/>
-          <a:ln w="19050">
-            <a:solidFill>
-              <a:srgbClr val="1127CF"/>
-            </a:solidFill>
-          </a:ln>
-        </p:spPr>
-        <p:style>
-          <a:lnRef idx="2">
-            <a:schemeClr val="accent1">
-              <a:shade val="50000"/>
-            </a:schemeClr>
-          </a:lnRef>
-          <a:fillRef idx="1">
-            <a:schemeClr val="accent1"/>
-          </a:fillRef>
-          <a:effectRef idx="0">
-            <a:schemeClr val="accent1"/>
-          </a:effectRef>
-          <a:fontRef idx="minor">
-            <a:schemeClr val="lt1"/>
-          </a:fontRef>
-        </p:style>
-        <p:txBody>
-          <a:bodyPr rtlCol="0" anchor="ctr"/>
-          <a:lstStyle/>
-          <a:p>
-            <a:pPr algn="ctr"/>
-            <a:endParaRPr lang="en-US"/>
-          </a:p>
-        </p:txBody>
-      </p:sp>
-      <p:sp>
-        <p:nvSpPr>
-          <p:cNvPr id="209" name="Rectangle 208">
-            <a:extLst>
-              <a:ext uri="{FF2B5EF4-FFF2-40B4-BE49-F238E27FC236}">
-                <a16:creationId xmlns:a16="http://schemas.microsoft.com/office/drawing/2014/main" id="{CEED73C1-8904-413D-BCF3-83A83BEAD01E}"/>
-              </a:ext>
-            </a:extLst>
-          </p:cNvPr>
-          <p:cNvSpPr/>
-          <p:nvPr/>
-        </p:nvSpPr>
-        <p:spPr>
-          <a:xfrm>
-            <a:off x="1753815" y="3859733"/>
-            <a:ext cx="2743200" cy="5142204"/>
-          </a:xfrm>
-          <a:prstGeom prst="rect">
-            <a:avLst/>
-          </a:prstGeom>
-          <a:noFill/>
-          <a:ln w="19050">
-            <a:solidFill>
-              <a:srgbClr val="9B16D3"/>
-            </a:solidFill>
-          </a:ln>
-        </p:spPr>
-        <p:style>
-          <a:lnRef idx="2">
-            <a:schemeClr val="accent1">
-              <a:shade val="50000"/>
-            </a:schemeClr>
-          </a:lnRef>
-          <a:fillRef idx="1">
-            <a:schemeClr val="accent1"/>
-          </a:fillRef>
-          <a:effectRef idx="0">
-            <a:schemeClr val="accent1"/>
-          </a:effectRef>
-          <a:fontRef idx="minor">
-            <a:schemeClr val="lt1"/>
-          </a:fontRef>
-        </p:style>
-        <p:txBody>
-          <a:bodyPr rtlCol="0" anchor="ctr"/>
-          <a:lstStyle/>
-          <a:p>
-            <a:pPr algn="ctr"/>
-            <a:endParaRPr lang="en-US"/>
-          </a:p>
-        </p:txBody>
-      </p:sp>
-      <p:sp>
-        <p:nvSpPr>
-          <p:cNvPr id="210" name="Rectangle 209">
-            <a:extLst>
-              <a:ext uri="{FF2B5EF4-FFF2-40B4-BE49-F238E27FC236}">
-                <a16:creationId xmlns:a16="http://schemas.microsoft.com/office/drawing/2014/main" id="{491F355C-D5CC-4007-895C-1CD303C16BAD}"/>
-              </a:ext>
-            </a:extLst>
-          </p:cNvPr>
-          <p:cNvSpPr/>
-          <p:nvPr/>
-        </p:nvSpPr>
-        <p:spPr>
-          <a:xfrm>
-            <a:off x="1753815" y="9004465"/>
-            <a:ext cx="2743200" cy="325895"/>
-          </a:xfrm>
-          <a:prstGeom prst="rect">
-            <a:avLst/>
-          </a:prstGeom>
-          <a:noFill/>
-          <a:ln w="19050">
-            <a:solidFill>
-              <a:srgbClr val="D71A73"/>
-            </a:solidFill>
-          </a:ln>
-        </p:spPr>
-        <p:style>
-          <a:lnRef idx="2">
-            <a:schemeClr val="accent1">
-              <a:shade val="50000"/>
-            </a:schemeClr>
-          </a:lnRef>
-          <a:fillRef idx="1">
-            <a:schemeClr val="accent1"/>
-          </a:fillRef>
-          <a:effectRef idx="0">
-            <a:schemeClr val="accent1"/>
-          </a:effectRef>
-          <a:fontRef idx="minor">
-            <a:schemeClr val="lt1"/>
-          </a:fontRef>
-        </p:style>
-        <p:txBody>
-          <a:bodyPr rtlCol="0" anchor="ctr"/>
-          <a:lstStyle/>
-          <a:p>
-            <a:pPr algn="ctr"/>
-            <a:endParaRPr lang="en-US"/>
-          </a:p>
-        </p:txBody>
-      </p:sp>
-      <p:sp>
-        <p:nvSpPr>
-          <p:cNvPr id="211" name="Rectangle 210">
-            <a:extLst>
-              <a:ext uri="{FF2B5EF4-FFF2-40B4-BE49-F238E27FC236}">
-                <a16:creationId xmlns:a16="http://schemas.microsoft.com/office/drawing/2014/main" id="{1CEF6541-87AF-485B-81AB-CF9354840184}"/>
-              </a:ext>
-            </a:extLst>
-          </p:cNvPr>
-          <p:cNvSpPr/>
-          <p:nvPr/>
-        </p:nvSpPr>
-        <p:spPr>
-          <a:xfrm>
-            <a:off x="1753815" y="9344627"/>
-            <a:ext cx="2743200" cy="500501"/>
-          </a:xfrm>
-          <a:prstGeom prst="rect">
-            <a:avLst/>
-          </a:prstGeom>
-          <a:noFill/>
-          <a:ln w="19050">
-            <a:solidFill>
-              <a:srgbClr val="DB601E"/>
-            </a:solidFill>
-          </a:ln>
-        </p:spPr>
-        <p:style>
-          <a:lnRef idx="2">
-            <a:schemeClr val="accent1">
-              <a:shade val="50000"/>
-            </a:schemeClr>
-          </a:lnRef>
-          <a:fillRef idx="1">
-            <a:schemeClr val="accent1"/>
-          </a:fillRef>
-          <a:effectRef idx="0">
-            <a:schemeClr val="accent1"/>
-          </a:effectRef>
-          <a:fontRef idx="minor">
-            <a:schemeClr val="lt1"/>
-          </a:fontRef>
-        </p:style>
-        <p:txBody>
-          <a:bodyPr rtlCol="0" anchor="ctr"/>
-          <a:lstStyle/>
-          <a:p>
-            <a:pPr algn="ctr"/>
-            <a:endParaRPr lang="en-US"/>
-          </a:p>
-        </p:txBody>
-      </p:sp>
       <p:sp>
         <p:nvSpPr>
           <p:cNvPr id="1346" name="TextBox 1345">

</xml_diff>

<commit_message>
Fixed several errors in figure legend
</commit_message>
<xml_diff>
--- a/figures/phylogeneticTrees/phylo-tree-clades.pptx
+++ b/figures/phylogeneticTrees/phylo-tree-clades.pptx
@@ -302,7 +302,7 @@
           <a:p>
             <a:fld id="{488CEBE3-1740-4D45-B435-43B16EB302B8}" type="datetimeFigureOut">
               <a:rPr lang="ko-KR" altLang="en-US" smtClean="0"/>
-              <a:t>2020-06-03</a:t>
+              <a:t>2020-06-09</a:t>
             </a:fld>
             <a:endParaRPr lang="ko-KR" altLang="en-US"/>
           </a:p>
@@ -470,7 +470,7 @@
           <a:p>
             <a:fld id="{488CEBE3-1740-4D45-B435-43B16EB302B8}" type="datetimeFigureOut">
               <a:rPr lang="ko-KR" altLang="en-US" smtClean="0"/>
-              <a:t>2020-06-03</a:t>
+              <a:t>2020-06-09</a:t>
             </a:fld>
             <a:endParaRPr lang="ko-KR" altLang="en-US"/>
           </a:p>
@@ -648,7 +648,7 @@
           <a:p>
             <a:fld id="{488CEBE3-1740-4D45-B435-43B16EB302B8}" type="datetimeFigureOut">
               <a:rPr lang="ko-KR" altLang="en-US" smtClean="0"/>
-              <a:t>2020-06-03</a:t>
+              <a:t>2020-06-09</a:t>
             </a:fld>
             <a:endParaRPr lang="ko-KR" altLang="en-US"/>
           </a:p>
@@ -816,7 +816,7 @@
           <a:p>
             <a:fld id="{488CEBE3-1740-4D45-B435-43B16EB302B8}" type="datetimeFigureOut">
               <a:rPr lang="ko-KR" altLang="en-US" smtClean="0"/>
-              <a:t>2020-06-03</a:t>
+              <a:t>2020-06-09</a:t>
             </a:fld>
             <a:endParaRPr lang="ko-KR" altLang="en-US"/>
           </a:p>
@@ -1061,7 +1061,7 @@
           <a:p>
             <a:fld id="{488CEBE3-1740-4D45-B435-43B16EB302B8}" type="datetimeFigureOut">
               <a:rPr lang="ko-KR" altLang="en-US" smtClean="0"/>
-              <a:t>2020-06-03</a:t>
+              <a:t>2020-06-09</a:t>
             </a:fld>
             <a:endParaRPr lang="ko-KR" altLang="en-US"/>
           </a:p>
@@ -1346,7 +1346,7 @@
           <a:p>
             <a:fld id="{488CEBE3-1740-4D45-B435-43B16EB302B8}" type="datetimeFigureOut">
               <a:rPr lang="ko-KR" altLang="en-US" smtClean="0"/>
-              <a:t>2020-06-03</a:t>
+              <a:t>2020-06-09</a:t>
             </a:fld>
             <a:endParaRPr lang="ko-KR" altLang="en-US"/>
           </a:p>
@@ -1770,7 +1770,7 @@
           <a:p>
             <a:fld id="{488CEBE3-1740-4D45-B435-43B16EB302B8}" type="datetimeFigureOut">
               <a:rPr lang="ko-KR" altLang="en-US" smtClean="0"/>
-              <a:t>2020-06-03</a:t>
+              <a:t>2020-06-09</a:t>
             </a:fld>
             <a:endParaRPr lang="ko-KR" altLang="en-US"/>
           </a:p>
@@ -1887,7 +1887,7 @@
           <a:p>
             <a:fld id="{488CEBE3-1740-4D45-B435-43B16EB302B8}" type="datetimeFigureOut">
               <a:rPr lang="ko-KR" altLang="en-US" smtClean="0"/>
-              <a:t>2020-06-03</a:t>
+              <a:t>2020-06-09</a:t>
             </a:fld>
             <a:endParaRPr lang="ko-KR" altLang="en-US"/>
           </a:p>
@@ -1982,7 +1982,7 @@
           <a:p>
             <a:fld id="{488CEBE3-1740-4D45-B435-43B16EB302B8}" type="datetimeFigureOut">
               <a:rPr lang="ko-KR" altLang="en-US" smtClean="0"/>
-              <a:t>2020-06-03</a:t>
+              <a:t>2020-06-09</a:t>
             </a:fld>
             <a:endParaRPr lang="ko-KR" altLang="en-US"/>
           </a:p>
@@ -2257,7 +2257,7 @@
           <a:p>
             <a:fld id="{488CEBE3-1740-4D45-B435-43B16EB302B8}" type="datetimeFigureOut">
               <a:rPr lang="ko-KR" altLang="en-US" smtClean="0"/>
-              <a:t>2020-06-03</a:t>
+              <a:t>2020-06-09</a:t>
             </a:fld>
             <a:endParaRPr lang="ko-KR" altLang="en-US"/>
           </a:p>
@@ -2509,7 +2509,7 @@
           <a:p>
             <a:fld id="{488CEBE3-1740-4D45-B435-43B16EB302B8}" type="datetimeFigureOut">
               <a:rPr lang="ko-KR" altLang="en-US" smtClean="0"/>
-              <a:t>2020-06-03</a:t>
+              <a:t>2020-06-09</a:t>
             </a:fld>
             <a:endParaRPr lang="ko-KR" altLang="en-US"/>
           </a:p>
@@ -2720,7 +2720,7 @@
           <a:p>
             <a:fld id="{488CEBE3-1740-4D45-B435-43B16EB302B8}" type="datetimeFigureOut">
               <a:rPr lang="ko-KR" altLang="en-US" smtClean="0"/>
-              <a:t>2020-06-03</a:t>
+              <a:t>2020-06-09</a:t>
             </a:fld>
             <a:endParaRPr lang="ko-KR" altLang="en-US"/>
           </a:p>
@@ -3109,14 +3109,14 @@
         </p:nvSpPr>
         <p:spPr>
           <a:xfrm>
-            <a:off x="1753815" y="9344627"/>
-            <a:ext cx="2743200" cy="500501"/>
+            <a:off x="1753815" y="9349094"/>
+            <a:ext cx="2743200" cy="496034"/>
           </a:xfrm>
           <a:prstGeom prst="rect">
             <a:avLst/>
           </a:prstGeom>
           <a:solidFill>
-            <a:srgbClr val="BCF5A5"/>
+            <a:srgbClr val="F0C8AA"/>
           </a:solidFill>
           <a:ln w="19050">
             <a:noFill/>
@@ -3161,14 +3161,14 @@
         </p:nvSpPr>
         <p:spPr>
           <a:xfrm>
-            <a:off x="1753815" y="9004465"/>
-            <a:ext cx="2743200" cy="325895"/>
+            <a:off x="1753815" y="9004466"/>
+            <a:ext cx="2743200" cy="327448"/>
           </a:xfrm>
           <a:prstGeom prst="rect">
             <a:avLst/>
           </a:prstGeom>
           <a:solidFill>
-            <a:srgbClr val="F6E0B8"/>
+            <a:srgbClr val="E6969C"/>
           </a:solidFill>
           <a:ln w="19050">
             <a:noFill/>
@@ -3213,14 +3213,14 @@
         </p:nvSpPr>
         <p:spPr>
           <a:xfrm>
-            <a:off x="1753815" y="3859733"/>
-            <a:ext cx="2743200" cy="5142204"/>
+            <a:off x="1753815" y="3861401"/>
+            <a:ext cx="2743200" cy="5127228"/>
           </a:xfrm>
           <a:prstGeom prst="rect">
             <a:avLst/>
           </a:prstGeom>
           <a:solidFill>
-            <a:srgbClr val="F8C4C4"/>
+            <a:srgbClr val="E894E2"/>
           </a:solidFill>
           <a:ln w="19050">
             <a:noFill/>
@@ -3272,7 +3272,7 @@
             <a:avLst/>
           </a:prstGeom>
           <a:solidFill>
-            <a:srgbClr val="EDC4F8"/>
+            <a:srgbClr val="A295E5"/>
           </a:solidFill>
           <a:ln w="19050">
             <a:noFill/>
@@ -3324,7 +3324,7 @@
             <a:avLst/>
           </a:prstGeom>
           <a:solidFill>
-            <a:srgbClr val="C4C5DE"/>
+            <a:srgbClr val="96B8E3"/>
           </a:solidFill>
           <a:ln w="19050">
             <a:noFill/>
@@ -3376,7 +3376,7 @@
             <a:avLst/>
           </a:prstGeom>
           <a:solidFill>
-            <a:srgbClr val="CAE3E4"/>
+            <a:srgbClr val="97E2DE"/>
           </a:solidFill>
           <a:ln w="19050">
             <a:noFill/>

</xml_diff>